<commit_message>
Working Version of js:update_invoice_allocation_amout
</commit_message>
<xml_diff>
--- a/docs/DataModel_0008.pptx
+++ b/docs/DataModel_0008.pptx
@@ -198,7 +198,7 @@
           <a:p>
             <a:fld id="{B73D83C3-B1EF-41BD-AB38-55253EB00D8D}" type="datetimeFigureOut">
               <a:rPr lang="en-CA" smtClean="0"/>
-              <a:t>2016-09-21</a:t>
+              <a:t>2017-01-18</a:t>
             </a:fld>
             <a:endParaRPr lang="en-CA"/>
           </a:p>
@@ -262,35 +262,35 @@
           <a:p>
             <a:pPr lvl="0"/>
             <a:r>
-              <a:rPr lang="en-US" smtClean="0"/>
+              <a:rPr lang="en-US"/>
               <a:t>Click to edit Master text styles</a:t>
             </a:r>
           </a:p>
           <a:p>
             <a:pPr lvl="1"/>
             <a:r>
-              <a:rPr lang="en-US" smtClean="0"/>
+              <a:rPr lang="en-US"/>
               <a:t>Second level</a:t>
             </a:r>
           </a:p>
           <a:p>
             <a:pPr lvl="2"/>
             <a:r>
-              <a:rPr lang="en-US" smtClean="0"/>
+              <a:rPr lang="en-US"/>
               <a:t>Third level</a:t>
             </a:r>
           </a:p>
           <a:p>
             <a:pPr lvl="3"/>
             <a:r>
-              <a:rPr lang="en-US" smtClean="0"/>
+              <a:rPr lang="en-US"/>
               <a:t>Fourth level</a:t>
             </a:r>
           </a:p>
           <a:p>
             <a:pPr lvl="4"/>
             <a:r>
-              <a:rPr lang="en-US" smtClean="0"/>
+              <a:rPr lang="en-US"/>
               <a:t>Fifth level</a:t>
             </a:r>
             <a:endParaRPr lang="en-CA"/>
@@ -592,7 +592,7 @@
           </a:lstStyle>
           <a:p>
             <a:r>
-              <a:rPr lang="en-US" smtClean="0"/>
+              <a:rPr lang="en-US"/>
               <a:t>Click to edit Master title style</a:t>
             </a:r>
             <a:endParaRPr lang="en-US" dirty="0"/>
@@ -657,7 +657,7 @@
           </a:lstStyle>
           <a:p>
             <a:r>
-              <a:rPr lang="en-US" smtClean="0"/>
+              <a:rPr lang="en-US"/>
               <a:t>Click to edit Master subtitle style</a:t>
             </a:r>
             <a:endParaRPr lang="en-US" dirty="0"/>
@@ -681,7 +681,7 @@
           <a:p>
             <a:fld id="{0DBCC253-98AB-4883-964C-29A8C3FD171B}" type="datetimeFigureOut">
               <a:rPr lang="en-CA" smtClean="0"/>
-              <a:t>2016-09-21</a:t>
+              <a:t>2017-01-18</a:t>
             </a:fld>
             <a:endParaRPr lang="en-CA"/>
           </a:p>
@@ -775,7 +775,7 @@
           <a:lstStyle/>
           <a:p>
             <a:r>
-              <a:rPr lang="en-US" smtClean="0"/>
+              <a:rPr lang="en-US"/>
               <a:t>Click to edit Master title style</a:t>
             </a:r>
             <a:endParaRPr lang="en-US" dirty="0"/>
@@ -799,35 +799,35 @@
           <a:p>
             <a:pPr lvl="0"/>
             <a:r>
-              <a:rPr lang="en-US" smtClean="0"/>
+              <a:rPr lang="en-US"/>
               <a:t>Click to edit Master text styles</a:t>
             </a:r>
           </a:p>
           <a:p>
             <a:pPr lvl="1"/>
             <a:r>
-              <a:rPr lang="en-US" smtClean="0"/>
+              <a:rPr lang="en-US"/>
               <a:t>Second level</a:t>
             </a:r>
           </a:p>
           <a:p>
             <a:pPr lvl="2"/>
             <a:r>
-              <a:rPr lang="en-US" smtClean="0"/>
+              <a:rPr lang="en-US"/>
               <a:t>Third level</a:t>
             </a:r>
           </a:p>
           <a:p>
             <a:pPr lvl="3"/>
             <a:r>
-              <a:rPr lang="en-US" smtClean="0"/>
+              <a:rPr lang="en-US"/>
               <a:t>Fourth level</a:t>
             </a:r>
           </a:p>
           <a:p>
             <a:pPr lvl="4"/>
             <a:r>
-              <a:rPr lang="en-US" smtClean="0"/>
+              <a:rPr lang="en-US"/>
               <a:t>Fifth level</a:t>
             </a:r>
             <a:endParaRPr lang="en-US" dirty="0"/>
@@ -851,7 +851,7 @@
           <a:p>
             <a:fld id="{0DBCC253-98AB-4883-964C-29A8C3FD171B}" type="datetimeFigureOut">
               <a:rPr lang="en-CA" smtClean="0"/>
-              <a:t>2016-09-21</a:t>
+              <a:t>2017-01-18</a:t>
             </a:fld>
             <a:endParaRPr lang="en-CA"/>
           </a:p>
@@ -950,7 +950,7 @@
           <a:lstStyle/>
           <a:p>
             <a:r>
-              <a:rPr lang="en-US" smtClean="0"/>
+              <a:rPr lang="en-US"/>
               <a:t>Click to edit Master title style</a:t>
             </a:r>
             <a:endParaRPr lang="en-US" dirty="0"/>
@@ -979,35 +979,35 @@
           <a:p>
             <a:pPr lvl="0"/>
             <a:r>
-              <a:rPr lang="en-US" smtClean="0"/>
+              <a:rPr lang="en-US"/>
               <a:t>Click to edit Master text styles</a:t>
             </a:r>
           </a:p>
           <a:p>
             <a:pPr lvl="1"/>
             <a:r>
-              <a:rPr lang="en-US" smtClean="0"/>
+              <a:rPr lang="en-US"/>
               <a:t>Second level</a:t>
             </a:r>
           </a:p>
           <a:p>
             <a:pPr lvl="2"/>
             <a:r>
-              <a:rPr lang="en-US" smtClean="0"/>
+              <a:rPr lang="en-US"/>
               <a:t>Third level</a:t>
             </a:r>
           </a:p>
           <a:p>
             <a:pPr lvl="3"/>
             <a:r>
-              <a:rPr lang="en-US" smtClean="0"/>
+              <a:rPr lang="en-US"/>
               <a:t>Fourth level</a:t>
             </a:r>
           </a:p>
           <a:p>
             <a:pPr lvl="4"/>
             <a:r>
-              <a:rPr lang="en-US" smtClean="0"/>
+              <a:rPr lang="en-US"/>
               <a:t>Fifth level</a:t>
             </a:r>
             <a:endParaRPr lang="en-US" dirty="0"/>
@@ -1031,7 +1031,7 @@
           <a:p>
             <a:fld id="{0DBCC253-98AB-4883-964C-29A8C3FD171B}" type="datetimeFigureOut">
               <a:rPr lang="en-CA" smtClean="0"/>
-              <a:t>2016-09-21</a:t>
+              <a:t>2017-01-18</a:t>
             </a:fld>
             <a:endParaRPr lang="en-CA"/>
           </a:p>
@@ -1284,7 +1284,7 @@
           <a:p>
             <a:pPr algn="ctr"/>
             <a:r>
-              <a:rPr lang="en-CA" sz="1800" b="1" dirty="0" smtClean="0">
+              <a:rPr lang="en-CA" sz="1800" b="1" dirty="0">
                 <a:solidFill>
                   <a:schemeClr val="tx2"/>
                 </a:solidFill>
@@ -1294,7 +1294,7 @@
               <a:t>WE</a:t>
             </a:r>
             <a:r>
-              <a:rPr lang="en-CA" sz="1800" b="1" baseline="0" dirty="0" smtClean="0">
+              <a:rPr lang="en-CA" sz="1800" b="1" baseline="0" dirty="0">
                 <a:solidFill>
                   <a:schemeClr val="tx2"/>
                 </a:solidFill>
@@ -1337,7 +1337,7 @@
           <a:p>
             <a:pPr algn="ctr"/>
             <a:r>
-              <a:rPr lang="en-CA" sz="1000" dirty="0" smtClean="0">
+              <a:rPr lang="en-CA" sz="1000" dirty="0">
                 <a:solidFill>
                   <a:schemeClr val="bg1">
                     <a:lumMod val="50000"/>
@@ -1348,15 +1348,6 @@
               </a:rPr>
               <a:t>www.weenhanceit.com</a:t>
             </a:r>
-            <a:endParaRPr lang="en-CA" sz="1000" dirty="0">
-              <a:solidFill>
-                <a:schemeClr val="bg1">
-                  <a:lumMod val="50000"/>
-                </a:schemeClr>
-              </a:solidFill>
-              <a:latin typeface="Arial" panose="020B0604020202020204" pitchFamily="34" charset="0"/>
-              <a:cs typeface="Arial" panose="020B0604020202020204" pitchFamily="34" charset="0"/>
-            </a:endParaRPr>
           </a:p>
         </p:txBody>
       </p:sp>
@@ -1384,39 +1375,21 @@
           <a:p>
             <a:pPr algn="ctr"/>
             <a:r>
-              <a:rPr lang="en-CA" sz="1200" b="1" dirty="0" smtClean="0">
+              <a:rPr lang="en-CA" sz="1200" b="1" dirty="0">
                 <a:latin typeface="Arial" panose="020B0604020202020204" pitchFamily="34" charset="0"/>
                 <a:cs typeface="Arial" panose="020B0604020202020204" pitchFamily="34" charset="0"/>
               </a:rPr>
               <a:t>V0008</a:t>
             </a:r>
-            <a:endParaRPr lang="en-CA" sz="1200" b="1" dirty="0" smtClean="0">
-              <a:latin typeface="Arial" panose="020B0604020202020204" pitchFamily="34" charset="0"/>
-              <a:cs typeface="Arial" panose="020B0604020202020204" pitchFamily="34" charset="0"/>
-            </a:endParaRPr>
           </a:p>
           <a:p>
             <a:pPr algn="ctr"/>
             <a:r>
-              <a:rPr lang="en-CA" sz="1100" b="0" baseline="0" dirty="0" smtClean="0">
+              <a:rPr lang="en-CA" sz="1100" b="0" baseline="0" dirty="0">
                 <a:latin typeface="Arial" panose="020B0604020202020204" pitchFamily="34" charset="0"/>
                 <a:cs typeface="Arial" panose="020B0604020202020204" pitchFamily="34" charset="0"/>
               </a:rPr>
-              <a:t> </a:t>
-            </a:r>
-            <a:r>
-              <a:rPr lang="en-CA" sz="1100" b="0" baseline="0" dirty="0" smtClean="0">
-                <a:latin typeface="Arial" panose="020B0604020202020204" pitchFamily="34" charset="0"/>
-                <a:cs typeface="Arial" panose="020B0604020202020204" pitchFamily="34" charset="0"/>
-              </a:rPr>
-              <a:t>21 </a:t>
-            </a:r>
-            <a:r>
-              <a:rPr lang="en-CA" sz="1100" b="0" baseline="0" dirty="0" smtClean="0">
-                <a:latin typeface="Arial" panose="020B0604020202020204" pitchFamily="34" charset="0"/>
-                <a:cs typeface="Arial" panose="020B0604020202020204" pitchFamily="34" charset="0"/>
-              </a:rPr>
-              <a:t>Sep 2016</a:t>
+              <a:t> 21 Sep 2016</a:t>
             </a:r>
           </a:p>
           <a:p>
@@ -1452,7 +1425,7 @@
           <a:p>
             <a:pPr algn="ctr"/>
             <a:r>
-              <a:rPr lang="en-CA" sz="1600" dirty="0" smtClean="0">
+              <a:rPr lang="en-CA" sz="1600" dirty="0">
                 <a:solidFill>
                   <a:schemeClr val="tx2"/>
                 </a:solidFill>
@@ -1462,7 +1435,7 @@
               <a:t>Autism</a:t>
             </a:r>
             <a:r>
-              <a:rPr lang="en-CA" sz="1600" baseline="0" dirty="0" smtClean="0">
+              <a:rPr lang="en-CA" sz="1600" baseline="0" dirty="0">
                 <a:solidFill>
                   <a:schemeClr val="tx2"/>
                 </a:solidFill>
@@ -1475,7 +1448,7 @@
           <a:p>
             <a:pPr algn="ctr"/>
             <a:r>
-              <a:rPr lang="en-CA" sz="1600" baseline="0" dirty="0" smtClean="0">
+              <a:rPr lang="en-CA" sz="1600" baseline="0" dirty="0">
                 <a:solidFill>
                   <a:schemeClr val="tx2"/>
                 </a:solidFill>
@@ -1541,7 +1514,7 @@
           <a:lstStyle/>
           <a:p>
             <a:r>
-              <a:rPr lang="en-US" smtClean="0"/>
+              <a:rPr lang="en-US"/>
               <a:t>Click to edit Master title style</a:t>
             </a:r>
             <a:endParaRPr lang="en-US" dirty="0"/>
@@ -1565,35 +1538,35 @@
           <a:p>
             <a:pPr lvl="0"/>
             <a:r>
-              <a:rPr lang="en-US" smtClean="0"/>
+              <a:rPr lang="en-US"/>
               <a:t>Click to edit Master text styles</a:t>
             </a:r>
           </a:p>
           <a:p>
             <a:pPr lvl="1"/>
             <a:r>
-              <a:rPr lang="en-US" smtClean="0"/>
+              <a:rPr lang="en-US"/>
               <a:t>Second level</a:t>
             </a:r>
           </a:p>
           <a:p>
             <a:pPr lvl="2"/>
             <a:r>
-              <a:rPr lang="en-US" smtClean="0"/>
+              <a:rPr lang="en-US"/>
               <a:t>Third level</a:t>
             </a:r>
           </a:p>
           <a:p>
             <a:pPr lvl="3"/>
             <a:r>
-              <a:rPr lang="en-US" smtClean="0"/>
+              <a:rPr lang="en-US"/>
               <a:t>Fourth level</a:t>
             </a:r>
           </a:p>
           <a:p>
             <a:pPr lvl="4"/>
             <a:r>
-              <a:rPr lang="en-US" smtClean="0"/>
+              <a:rPr lang="en-US"/>
               <a:t>Fifth level</a:t>
             </a:r>
             <a:endParaRPr lang="en-US" dirty="0"/>
@@ -1617,7 +1590,7 @@
           <a:p>
             <a:fld id="{0DBCC253-98AB-4883-964C-29A8C3FD171B}" type="datetimeFigureOut">
               <a:rPr lang="en-CA" smtClean="0"/>
-              <a:t>2016-09-21</a:t>
+              <a:t>2017-01-18</a:t>
             </a:fld>
             <a:endParaRPr lang="en-CA"/>
           </a:p>
@@ -1720,7 +1693,7 @@
           </a:lstStyle>
           <a:p>
             <a:r>
-              <a:rPr lang="en-US" smtClean="0"/>
+              <a:rPr lang="en-US"/>
               <a:t>Click to edit Master title style</a:t>
             </a:r>
             <a:endParaRPr lang="en-US" dirty="0"/>
@@ -1838,7 +1811,7 @@
           <a:p>
             <a:pPr lvl="0"/>
             <a:r>
-              <a:rPr lang="en-US" smtClean="0"/>
+              <a:rPr lang="en-US"/>
               <a:t>Click to edit Master text styles</a:t>
             </a:r>
           </a:p>
@@ -1861,7 +1834,7 @@
           <a:p>
             <a:fld id="{0DBCC253-98AB-4883-964C-29A8C3FD171B}" type="datetimeFigureOut">
               <a:rPr lang="en-CA" smtClean="0"/>
-              <a:t>2016-09-21</a:t>
+              <a:t>2017-01-18</a:t>
             </a:fld>
             <a:endParaRPr lang="en-CA"/>
           </a:p>
@@ -1955,7 +1928,7 @@
           <a:lstStyle/>
           <a:p>
             <a:r>
-              <a:rPr lang="en-US" smtClean="0"/>
+              <a:rPr lang="en-US"/>
               <a:t>Click to edit Master title style</a:t>
             </a:r>
             <a:endParaRPr lang="en-US" dirty="0"/>
@@ -1984,35 +1957,35 @@
           <a:p>
             <a:pPr lvl="0"/>
             <a:r>
-              <a:rPr lang="en-US" smtClean="0"/>
+              <a:rPr lang="en-US"/>
               <a:t>Click to edit Master text styles</a:t>
             </a:r>
           </a:p>
           <a:p>
             <a:pPr lvl="1"/>
             <a:r>
-              <a:rPr lang="en-US" smtClean="0"/>
+              <a:rPr lang="en-US"/>
               <a:t>Second level</a:t>
             </a:r>
           </a:p>
           <a:p>
             <a:pPr lvl="2"/>
             <a:r>
-              <a:rPr lang="en-US" smtClean="0"/>
+              <a:rPr lang="en-US"/>
               <a:t>Third level</a:t>
             </a:r>
           </a:p>
           <a:p>
             <a:pPr lvl="3"/>
             <a:r>
-              <a:rPr lang="en-US" smtClean="0"/>
+              <a:rPr lang="en-US"/>
               <a:t>Fourth level</a:t>
             </a:r>
           </a:p>
           <a:p>
             <a:pPr lvl="4"/>
             <a:r>
-              <a:rPr lang="en-US" smtClean="0"/>
+              <a:rPr lang="en-US"/>
               <a:t>Fifth level</a:t>
             </a:r>
             <a:endParaRPr lang="en-US" dirty="0"/>
@@ -2041,35 +2014,35 @@
           <a:p>
             <a:pPr lvl="0"/>
             <a:r>
-              <a:rPr lang="en-US" smtClean="0"/>
+              <a:rPr lang="en-US"/>
               <a:t>Click to edit Master text styles</a:t>
             </a:r>
           </a:p>
           <a:p>
             <a:pPr lvl="1"/>
             <a:r>
-              <a:rPr lang="en-US" smtClean="0"/>
+              <a:rPr lang="en-US"/>
               <a:t>Second level</a:t>
             </a:r>
           </a:p>
           <a:p>
             <a:pPr lvl="2"/>
             <a:r>
-              <a:rPr lang="en-US" smtClean="0"/>
+              <a:rPr lang="en-US"/>
               <a:t>Third level</a:t>
             </a:r>
           </a:p>
           <a:p>
             <a:pPr lvl="3"/>
             <a:r>
-              <a:rPr lang="en-US" smtClean="0"/>
+              <a:rPr lang="en-US"/>
               <a:t>Fourth level</a:t>
             </a:r>
           </a:p>
           <a:p>
             <a:pPr lvl="4"/>
             <a:r>
-              <a:rPr lang="en-US" smtClean="0"/>
+              <a:rPr lang="en-US"/>
               <a:t>Fifth level</a:t>
             </a:r>
             <a:endParaRPr lang="en-US" dirty="0"/>
@@ -2093,7 +2066,7 @@
           <a:p>
             <a:fld id="{0DBCC253-98AB-4883-964C-29A8C3FD171B}" type="datetimeFigureOut">
               <a:rPr lang="en-CA" smtClean="0"/>
-              <a:t>2016-09-21</a:t>
+              <a:t>2017-01-18</a:t>
             </a:fld>
             <a:endParaRPr lang="en-CA"/>
           </a:p>
@@ -2192,7 +2165,7 @@
           <a:lstStyle/>
           <a:p>
             <a:r>
-              <a:rPr lang="en-US" smtClean="0"/>
+              <a:rPr lang="en-US"/>
               <a:t>Click to edit Master title style</a:t>
             </a:r>
             <a:endParaRPr lang="en-US" dirty="0"/>
@@ -2258,7 +2231,7 @@
           <a:p>
             <a:pPr lvl="0"/>
             <a:r>
-              <a:rPr lang="en-US" smtClean="0"/>
+              <a:rPr lang="en-US"/>
               <a:t>Click to edit Master text styles</a:t>
             </a:r>
           </a:p>
@@ -2286,35 +2259,35 @@
           <a:p>
             <a:pPr lvl="0"/>
             <a:r>
-              <a:rPr lang="en-US" smtClean="0"/>
+              <a:rPr lang="en-US"/>
               <a:t>Click to edit Master text styles</a:t>
             </a:r>
           </a:p>
           <a:p>
             <a:pPr lvl="1"/>
             <a:r>
-              <a:rPr lang="en-US" smtClean="0"/>
+              <a:rPr lang="en-US"/>
               <a:t>Second level</a:t>
             </a:r>
           </a:p>
           <a:p>
             <a:pPr lvl="2"/>
             <a:r>
-              <a:rPr lang="en-US" smtClean="0"/>
+              <a:rPr lang="en-US"/>
               <a:t>Third level</a:t>
             </a:r>
           </a:p>
           <a:p>
             <a:pPr lvl="3"/>
             <a:r>
-              <a:rPr lang="en-US" smtClean="0"/>
+              <a:rPr lang="en-US"/>
               <a:t>Fourth level</a:t>
             </a:r>
           </a:p>
           <a:p>
             <a:pPr lvl="4"/>
             <a:r>
-              <a:rPr lang="en-US" smtClean="0"/>
+              <a:rPr lang="en-US"/>
               <a:t>Fifth level</a:t>
             </a:r>
             <a:endParaRPr lang="en-US" dirty="0"/>
@@ -2380,7 +2353,7 @@
           <a:p>
             <a:pPr lvl="0"/>
             <a:r>
-              <a:rPr lang="en-US" smtClean="0"/>
+              <a:rPr lang="en-US"/>
               <a:t>Click to edit Master text styles</a:t>
             </a:r>
           </a:p>
@@ -2408,35 +2381,35 @@
           <a:p>
             <a:pPr lvl="0"/>
             <a:r>
-              <a:rPr lang="en-US" smtClean="0"/>
+              <a:rPr lang="en-US"/>
               <a:t>Click to edit Master text styles</a:t>
             </a:r>
           </a:p>
           <a:p>
             <a:pPr lvl="1"/>
             <a:r>
-              <a:rPr lang="en-US" smtClean="0"/>
+              <a:rPr lang="en-US"/>
               <a:t>Second level</a:t>
             </a:r>
           </a:p>
           <a:p>
             <a:pPr lvl="2"/>
             <a:r>
-              <a:rPr lang="en-US" smtClean="0"/>
+              <a:rPr lang="en-US"/>
               <a:t>Third level</a:t>
             </a:r>
           </a:p>
           <a:p>
             <a:pPr lvl="3"/>
             <a:r>
-              <a:rPr lang="en-US" smtClean="0"/>
+              <a:rPr lang="en-US"/>
               <a:t>Fourth level</a:t>
             </a:r>
           </a:p>
           <a:p>
             <a:pPr lvl="4"/>
             <a:r>
-              <a:rPr lang="en-US" smtClean="0"/>
+              <a:rPr lang="en-US"/>
               <a:t>Fifth level</a:t>
             </a:r>
             <a:endParaRPr lang="en-US" dirty="0"/>
@@ -2460,7 +2433,7 @@
           <a:p>
             <a:fld id="{0DBCC253-98AB-4883-964C-29A8C3FD171B}" type="datetimeFigureOut">
               <a:rPr lang="en-CA" smtClean="0"/>
-              <a:t>2016-09-21</a:t>
+              <a:t>2017-01-18</a:t>
             </a:fld>
             <a:endParaRPr lang="en-CA"/>
           </a:p>
@@ -2554,7 +2527,7 @@
           <a:lstStyle/>
           <a:p>
             <a:r>
-              <a:rPr lang="en-US" smtClean="0"/>
+              <a:rPr lang="en-US"/>
               <a:t>Click to edit Master title style</a:t>
             </a:r>
             <a:endParaRPr lang="en-US" dirty="0"/>
@@ -2578,7 +2551,7 @@
           <a:p>
             <a:fld id="{0DBCC253-98AB-4883-964C-29A8C3FD171B}" type="datetimeFigureOut">
               <a:rPr lang="en-CA" smtClean="0"/>
-              <a:t>2016-09-21</a:t>
+              <a:t>2017-01-18</a:t>
             </a:fld>
             <a:endParaRPr lang="en-CA"/>
           </a:p>
@@ -2673,7 +2646,7 @@
           <a:p>
             <a:fld id="{0DBCC253-98AB-4883-964C-29A8C3FD171B}" type="datetimeFigureOut">
               <a:rPr lang="en-CA" smtClean="0"/>
-              <a:t>2016-09-21</a:t>
+              <a:t>2017-01-18</a:t>
             </a:fld>
             <a:endParaRPr lang="en-CA"/>
           </a:p>
@@ -2776,7 +2749,7 @@
           </a:lstStyle>
           <a:p>
             <a:r>
-              <a:rPr lang="en-US" smtClean="0"/>
+              <a:rPr lang="en-US"/>
               <a:t>Click to edit Master title style</a:t>
             </a:r>
             <a:endParaRPr lang="en-US" dirty="0"/>
@@ -2833,35 +2806,35 @@
           <a:p>
             <a:pPr lvl="0"/>
             <a:r>
-              <a:rPr lang="en-US" smtClean="0"/>
+              <a:rPr lang="en-US"/>
               <a:t>Click to edit Master text styles</a:t>
             </a:r>
           </a:p>
           <a:p>
             <a:pPr lvl="1"/>
             <a:r>
-              <a:rPr lang="en-US" smtClean="0"/>
+              <a:rPr lang="en-US"/>
               <a:t>Second level</a:t>
             </a:r>
           </a:p>
           <a:p>
             <a:pPr lvl="2"/>
             <a:r>
-              <a:rPr lang="en-US" smtClean="0"/>
+              <a:rPr lang="en-US"/>
               <a:t>Third level</a:t>
             </a:r>
           </a:p>
           <a:p>
             <a:pPr lvl="3"/>
             <a:r>
-              <a:rPr lang="en-US" smtClean="0"/>
+              <a:rPr lang="en-US"/>
               <a:t>Fourth level</a:t>
             </a:r>
           </a:p>
           <a:p>
             <a:pPr lvl="4"/>
             <a:r>
-              <a:rPr lang="en-US" smtClean="0"/>
+              <a:rPr lang="en-US"/>
               <a:t>Fifth level</a:t>
             </a:r>
             <a:endParaRPr lang="en-US" dirty="0"/>
@@ -2927,7 +2900,7 @@
           <a:p>
             <a:pPr lvl="0"/>
             <a:r>
-              <a:rPr lang="en-US" smtClean="0"/>
+              <a:rPr lang="en-US"/>
               <a:t>Click to edit Master text styles</a:t>
             </a:r>
           </a:p>
@@ -2950,7 +2923,7 @@
           <a:p>
             <a:fld id="{0DBCC253-98AB-4883-964C-29A8C3FD171B}" type="datetimeFigureOut">
               <a:rPr lang="en-CA" smtClean="0"/>
-              <a:t>2016-09-21</a:t>
+              <a:t>2017-01-18</a:t>
             </a:fld>
             <a:endParaRPr lang="en-CA"/>
           </a:p>
@@ -3053,7 +3026,7 @@
           </a:lstStyle>
           <a:p>
             <a:r>
-              <a:rPr lang="en-US" smtClean="0"/>
+              <a:rPr lang="en-US"/>
               <a:t>Click to edit Master title style</a:t>
             </a:r>
             <a:endParaRPr lang="en-US" dirty="0"/>
@@ -3118,7 +3091,7 @@
           </a:lstStyle>
           <a:p>
             <a:r>
-              <a:rPr lang="en-US" smtClean="0"/>
+              <a:rPr lang="en-US"/>
               <a:t>Click icon to add picture</a:t>
             </a:r>
             <a:endParaRPr lang="en-US" dirty="0"/>
@@ -3184,7 +3157,7 @@
           <a:p>
             <a:pPr lvl="0"/>
             <a:r>
-              <a:rPr lang="en-US" smtClean="0"/>
+              <a:rPr lang="en-US"/>
               <a:t>Click to edit Master text styles</a:t>
             </a:r>
           </a:p>
@@ -3207,7 +3180,7 @@
           <a:p>
             <a:fld id="{0DBCC253-98AB-4883-964C-29A8C3FD171B}" type="datetimeFigureOut">
               <a:rPr lang="en-CA" smtClean="0"/>
-              <a:t>2016-09-21</a:t>
+              <a:t>2017-01-18</a:t>
             </a:fld>
             <a:endParaRPr lang="en-CA"/>
           </a:p>
@@ -3316,7 +3289,7 @@
           <a:lstStyle/>
           <a:p>
             <a:r>
-              <a:rPr lang="en-US" smtClean="0"/>
+              <a:rPr lang="en-US"/>
               <a:t>Click to edit Master title style</a:t>
             </a:r>
             <a:endParaRPr lang="en-US" dirty="0"/>
@@ -3350,35 +3323,35 @@
           <a:p>
             <a:pPr lvl="0"/>
             <a:r>
-              <a:rPr lang="en-US" smtClean="0"/>
+              <a:rPr lang="en-US"/>
               <a:t>Click to edit Master text styles</a:t>
             </a:r>
           </a:p>
           <a:p>
             <a:pPr lvl="1"/>
             <a:r>
-              <a:rPr lang="en-US" smtClean="0"/>
+              <a:rPr lang="en-US"/>
               <a:t>Second level</a:t>
             </a:r>
           </a:p>
           <a:p>
             <a:pPr lvl="2"/>
             <a:r>
-              <a:rPr lang="en-US" smtClean="0"/>
+              <a:rPr lang="en-US"/>
               <a:t>Third level</a:t>
             </a:r>
           </a:p>
           <a:p>
             <a:pPr lvl="3"/>
             <a:r>
-              <a:rPr lang="en-US" smtClean="0"/>
+              <a:rPr lang="en-US"/>
               <a:t>Fourth level</a:t>
             </a:r>
           </a:p>
           <a:p>
             <a:pPr lvl="4"/>
             <a:r>
-              <a:rPr lang="en-US" smtClean="0"/>
+              <a:rPr lang="en-US"/>
               <a:t>Fifth level</a:t>
             </a:r>
             <a:endParaRPr lang="en-US" dirty="0"/>
@@ -3420,7 +3393,7 @@
           <a:p>
             <a:fld id="{0DBCC253-98AB-4883-964C-29A8C3FD171B}" type="datetimeFigureOut">
               <a:rPr lang="en-CA" smtClean="0"/>
-              <a:t>2016-09-21</a:t>
+              <a:t>2017-01-18</a:t>
             </a:fld>
             <a:endParaRPr lang="en-CA"/>
           </a:p>
@@ -3877,10 +3850,6 @@
               <a:rPr lang="en-CA" sz="1000" dirty="0" err="1"/>
               <a:t>ProvinceCode</a:t>
             </a:r>
-            <a:r>
-              <a:rPr lang="en-CA" sz="1000" dirty="0"/>
-              <a:t/>
-            </a:r>
             <a:br>
               <a:rPr lang="en-CA" sz="1000" dirty="0"/>
             </a:br>
@@ -3937,16 +3906,12 @@
               <a:rPr lang="en-CA" sz="1000" dirty="0"/>
             </a:br>
             <a:r>
-              <a:rPr lang="en-CA" sz="1000" dirty="0" err="1" smtClean="0"/>
+              <a:rPr lang="en-CA" sz="1000" dirty="0" err="1"/>
               <a:t>has_many</a:t>
             </a:r>
             <a:r>
-              <a:rPr lang="en-CA" sz="1000" dirty="0" smtClean="0"/>
-              <a:t> </a:t>
-            </a:r>
-            <a:r>
               <a:rPr lang="en-CA" sz="1000" dirty="0"/>
-              <a:t>:addresses</a:t>
+              <a:t> :addresses</a:t>
             </a:r>
             <a:br>
               <a:rPr lang="en-CA" sz="1000" dirty="0"/>
@@ -3963,10 +3928,6 @@
               <a:rPr lang="en-CA" sz="1000" dirty="0" err="1"/>
               <a:t>phone_numers</a:t>
             </a:r>
-            <a:r>
-              <a:rPr lang="en-CA" sz="1000" dirty="0"/>
-              <a:t/>
-            </a:r>
             <a:br>
               <a:rPr lang="en-CA" sz="1000" dirty="0"/>
             </a:br>
@@ -3979,7 +3940,7 @@
               <a:t> :</a:t>
             </a:r>
             <a:r>
-              <a:rPr lang="en-CA" sz="1000" dirty="0" err="1" smtClean="0"/>
+              <a:rPr lang="en-CA" sz="1000" dirty="0" err="1"/>
               <a:t>funded_people</a:t>
             </a:r>
             <a:endParaRPr lang="en-CA" sz="1000" dirty="0"/>
@@ -4013,10 +3974,6 @@
               <a:rPr lang="en-CA" sz="1000" dirty="0" err="1"/>
               <a:t>FundedPerson</a:t>
             </a:r>
-            <a:r>
-              <a:rPr lang="en-CA" sz="1000" dirty="0"/>
-              <a:t/>
-            </a:r>
             <a:br>
               <a:rPr lang="en-CA" sz="1000" dirty="0"/>
             </a:br>
@@ -4026,11 +3983,7 @@
             </a:r>
             <a:r>
               <a:rPr lang="en-CA" sz="1000" dirty="0"/>
-              <a:t>  </a:t>
-            </a:r>
-            <a:r>
-              <a:rPr lang="en-CA" sz="1000" dirty="0" smtClean="0"/>
-              <a:t>:user</a:t>
+              <a:t>  :user</a:t>
             </a:r>
           </a:p>
           <a:p>
@@ -4040,16 +3993,12 @@
               <a:t>	</a:t>
             </a:r>
             <a:r>
-              <a:rPr lang="en-CA" sz="1000" dirty="0" err="1" smtClean="0"/>
+              <a:rPr lang="en-CA" sz="1000" dirty="0" err="1"/>
               <a:t>has_many</a:t>
             </a:r>
             <a:r>
-              <a:rPr lang="en-CA" sz="1000" dirty="0" smtClean="0"/>
-              <a:t> :</a:t>
-            </a:r>
-            <a:r>
-              <a:rPr lang="en-CA" sz="1000" dirty="0" smtClean="0"/>
-              <a:t>cf0925</a:t>
+              <a:rPr lang="en-CA" sz="1000" dirty="0"/>
+              <a:t> :cf0925</a:t>
             </a:r>
           </a:p>
           <a:p>
@@ -4059,15 +4008,15 @@
               <a:t>	</a:t>
             </a:r>
             <a:r>
-              <a:rPr lang="en-CA" sz="1000" dirty="0" err="1" smtClean="0"/>
+              <a:rPr lang="en-CA" sz="1000" dirty="0" err="1"/>
               <a:t>has_many</a:t>
             </a:r>
             <a:r>
-              <a:rPr lang="en-CA" sz="1000" dirty="0" smtClean="0"/>
+              <a:rPr lang="en-CA" sz="1000" dirty="0"/>
               <a:t> :</a:t>
             </a:r>
             <a:r>
-              <a:rPr lang="en-CA" sz="1000" dirty="0" err="1" smtClean="0"/>
+              <a:rPr lang="en-CA" sz="1000" dirty="0" err="1"/>
               <a:t>inovices</a:t>
             </a:r>
             <a:endParaRPr lang="en-CA" sz="1000" dirty="0"/>
@@ -4098,12 +4047,8 @@
           <a:p>
             <a:pPr marL="271463" indent="-271463"/>
             <a:r>
-              <a:rPr lang="en-CA" sz="1000" dirty="0" smtClean="0"/>
+              <a:rPr lang="en-CA" sz="1000" dirty="0"/>
               <a:t>Address</a:t>
-            </a:r>
-            <a:r>
-              <a:rPr lang="en-CA" sz="1000" dirty="0"/>
-              <a:t/>
             </a:r>
             <a:br>
               <a:rPr lang="en-CA" sz="1000" dirty="0"/>
@@ -4117,27 +4062,19 @@
               <a:t>  :</a:t>
             </a:r>
             <a:r>
-              <a:rPr lang="en-CA" sz="1000" dirty="0" err="1" smtClean="0"/>
+              <a:rPr lang="en-CA" sz="1000" dirty="0" err="1"/>
               <a:t>province_code</a:t>
             </a:r>
-            <a:r>
-              <a:rPr lang="en-CA" sz="1000" dirty="0" smtClean="0"/>
-              <a:t/>
-            </a:r>
             <a:br>
-              <a:rPr lang="en-CA" sz="1000" dirty="0" smtClean="0"/>
+              <a:rPr lang="en-CA" sz="1000" dirty="0"/>
             </a:br>
             <a:r>
-              <a:rPr lang="en-CA" sz="1000" dirty="0" err="1" smtClean="0"/>
+              <a:rPr lang="en-CA" sz="1000" dirty="0" err="1"/>
               <a:t>belongs_to</a:t>
             </a:r>
             <a:r>
               <a:rPr lang="en-CA" sz="1000" dirty="0"/>
-              <a:t> </a:t>
-            </a:r>
-            <a:r>
-              <a:rPr lang="en-CA" sz="1000" dirty="0" smtClean="0"/>
-              <a:t> :user</a:t>
+              <a:t>  :user</a:t>
             </a:r>
           </a:p>
           <a:p>
@@ -4170,25 +4107,20 @@
           <a:p>
             <a:pPr marL="271463" indent="-271463"/>
             <a:r>
-              <a:rPr lang="en-CA" sz="1000" dirty="0" err="1" smtClean="0"/>
+              <a:rPr lang="en-CA" sz="1000" dirty="0" err="1"/>
               <a:t>PhoneNumber</a:t>
-            </a:r>
-            <a:r>
-              <a:rPr lang="en-CA" sz="1000" dirty="0"/>
-              <a:t/>
             </a:r>
             <a:br>
               <a:rPr lang="en-CA" sz="1000" dirty="0"/>
             </a:br>
             <a:r>
-              <a:rPr lang="en-CA" sz="1000" dirty="0" err="1" smtClean="0"/>
+              <a:rPr lang="en-CA" sz="1000" dirty="0" err="1"/>
               <a:t>belongs_to</a:t>
             </a:r>
             <a:r>
-              <a:rPr lang="en-CA" sz="1000" dirty="0" smtClean="0"/>
+              <a:rPr lang="en-CA" sz="1000" dirty="0"/>
               <a:t>  :user</a:t>
             </a:r>
-            <a:endParaRPr lang="en-CA" sz="1000" dirty="0"/>
           </a:p>
         </p:txBody>
       </p:sp>
@@ -4215,10 +4147,9 @@
           <a:lstStyle/>
           <a:p>
             <a:r>
-              <a:rPr lang="en-CA" sz="1100" b="1" dirty="0" smtClean="0"/>
+              <a:rPr lang="en-CA" sz="1100" b="1" dirty="0"/>
               <a:t>(forms)</a:t>
             </a:r>
-            <a:endParaRPr lang="en-CA" sz="1100" b="1" dirty="0"/>
           </a:p>
         </p:txBody>
       </p:sp>
@@ -4245,10 +4176,9 @@
           <a:lstStyle/>
           <a:p>
             <a:r>
-              <a:rPr lang="en-CA" sz="1100" b="1" dirty="0" smtClean="0"/>
+              <a:rPr lang="en-CA" sz="1100" b="1" dirty="0"/>
               <a:t>(cf0925s)</a:t>
             </a:r>
-            <a:endParaRPr lang="en-CA" sz="1100" b="1" dirty="0"/>
           </a:p>
         </p:txBody>
       </p:sp>
@@ -4275,10 +4205,9 @@
           <a:lstStyle/>
           <a:p>
             <a:r>
-              <a:rPr lang="en-CA" sz="1100" b="1" dirty="0" smtClean="0"/>
+              <a:rPr lang="en-CA" sz="1100" b="1" dirty="0"/>
               <a:t>(invoices)</a:t>
             </a:r>
-            <a:endParaRPr lang="en-CA" sz="1100" b="1" dirty="0"/>
           </a:p>
         </p:txBody>
       </p:sp>
@@ -4360,7 +4289,7 @@
           <a:p>
             <a:pPr marL="271463" indent="-271463"/>
             <a:r>
-              <a:rPr lang="en-CA" sz="1000" dirty="0" smtClean="0"/>
+              <a:rPr lang="en-CA" sz="1000" dirty="0"/>
               <a:t>Form</a:t>
             </a:r>
           </a:p>
@@ -4371,20 +4300,12 @@
               <a:t>	</a:t>
             </a:r>
             <a:r>
-              <a:rPr lang="en-CA" sz="1000" dirty="0" err="1" smtClean="0"/>
+              <a:rPr lang="en-CA" sz="1000" dirty="0" err="1"/>
               <a:t>has_many</a:t>
             </a:r>
             <a:r>
               <a:rPr lang="en-CA" sz="1000" dirty="0"/>
-              <a:t>	</a:t>
-            </a:r>
-            <a:r>
-              <a:rPr lang="en-CA" sz="1000" dirty="0" smtClean="0"/>
-              <a:t>:cf0925s</a:t>
-            </a:r>
-            <a:r>
-              <a:rPr lang="en-CA" sz="1000" dirty="0"/>
-              <a:t/>
+              <a:t>	:cf0925s</a:t>
             </a:r>
             <a:br>
               <a:rPr lang="en-CA" sz="1000" dirty="0"/>
@@ -4398,7 +4319,7 @@
               <a:t>  :</a:t>
             </a:r>
             <a:r>
-              <a:rPr lang="en-CA" sz="1000" dirty="0" err="1" smtClean="0"/>
+              <a:rPr lang="en-CA" sz="1000" dirty="0" err="1"/>
               <a:t>province_code</a:t>
             </a:r>
             <a:endParaRPr lang="en-CA" sz="1000" dirty="0"/>
@@ -4413,7 +4334,7 @@
         </p:nvSpPr>
         <p:spPr>
           <a:xfrm>
-            <a:off x="6803892" y="1874326"/>
+            <a:off x="6802326" y="2196294"/>
             <a:ext cx="2260875" cy="553998"/>
           </a:xfrm>
           <a:prstGeom prst="rect">
@@ -4429,7 +4350,7 @@
           <a:p>
             <a:pPr marL="271463" indent="-271463"/>
             <a:r>
-              <a:rPr lang="en-CA" sz="1000" dirty="0" smtClean="0"/>
+              <a:rPr lang="en-CA" sz="1000" dirty="0"/>
               <a:t>Invoice</a:t>
             </a:r>
           </a:p>
@@ -4440,38 +4361,33 @@
               <a:t>	</a:t>
             </a:r>
             <a:r>
-              <a:rPr lang="en-CA" sz="1000" dirty="0" err="1" smtClean="0"/>
+              <a:rPr lang="en-CA" sz="1000" dirty="0" err="1"/>
               <a:t>belongs_to</a:t>
             </a:r>
             <a:r>
-              <a:rPr lang="en-CA" sz="1000" dirty="0" smtClean="0"/>
+              <a:rPr lang="en-CA" sz="1000" dirty="0"/>
               <a:t> :</a:t>
             </a:r>
             <a:r>
-              <a:rPr lang="en-CA" sz="1000" dirty="0" err="1" smtClean="0"/>
+              <a:rPr lang="en-CA" sz="1000" dirty="0" err="1"/>
               <a:t>funded_person</a:t>
             </a:r>
-            <a:endParaRPr lang="en-CA" sz="1000" dirty="0" smtClean="0"/>
+            <a:endParaRPr lang="en-CA" sz="1000" dirty="0"/>
           </a:p>
           <a:p>
             <a:pPr marL="271463" indent="-271463"/>
             <a:r>
-              <a:rPr lang="en-CA" sz="1000" dirty="0" smtClean="0"/>
+              <a:rPr lang="en-CA" sz="1000" dirty="0"/>
               <a:t>	</a:t>
             </a:r>
             <a:r>
-              <a:rPr lang="en-CA" sz="1000" dirty="0" err="1" smtClean="0"/>
+              <a:rPr lang="en-CA" sz="1000" dirty="0" err="1"/>
               <a:t>belongs_to</a:t>
             </a:r>
             <a:r>
-              <a:rPr lang="en-CA" sz="1000" dirty="0" smtClean="0"/>
-              <a:t>  :</a:t>
-            </a:r>
-            <a:r>
-              <a:rPr lang="en-CA" sz="1000" dirty="0" smtClean="0"/>
-              <a:t>cf0925, optional: true</a:t>
-            </a:r>
-            <a:endParaRPr lang="en-CA" sz="1000" dirty="0" smtClean="0"/>
+              <a:rPr lang="en-CA" sz="1000" dirty="0"/>
+              <a:t>  :cf0925, optional: true</a:t>
+            </a:r>
           </a:p>
         </p:txBody>
       </p:sp>
@@ -4499,7 +4415,7 @@
           <a:p>
             <a:pPr marL="271463" indent="-271463"/>
             <a:r>
-              <a:rPr lang="en-CA" sz="1000" dirty="0" smtClean="0"/>
+              <a:rPr lang="en-CA" sz="1000" dirty="0"/>
               <a:t>Cf0925</a:t>
             </a:r>
           </a:p>
@@ -4510,20 +4426,12 @@
               <a:t>	</a:t>
             </a:r>
             <a:r>
-              <a:rPr lang="en-CA" sz="1000" dirty="0" err="1" smtClean="0"/>
+              <a:rPr lang="en-CA" sz="1000" dirty="0" err="1"/>
               <a:t>has_many</a:t>
             </a:r>
             <a:r>
               <a:rPr lang="en-CA" sz="1000"/>
-              <a:t>	</a:t>
-            </a:r>
-            <a:r>
-              <a:rPr lang="en-CA" sz="1000" smtClean="0"/>
-              <a:t>:invoices</a:t>
-            </a:r>
-            <a:r>
-              <a:rPr lang="en-CA" sz="1000" dirty="0"/>
-              <a:t/>
+              <a:t>	:invoices</a:t>
             </a:r>
             <a:br>
               <a:rPr lang="en-CA" sz="1000" dirty="0"/>
@@ -4534,17 +4442,13 @@
             </a:r>
             <a:r>
               <a:rPr lang="en-CA" sz="1000" dirty="0"/>
-              <a:t>  </a:t>
-            </a:r>
-            <a:r>
-              <a:rPr lang="en-CA" sz="1000" dirty="0" smtClean="0"/>
-              <a:t>:</a:t>
-            </a:r>
-            <a:r>
-              <a:rPr lang="en-CA" sz="1000" dirty="0" err="1" smtClean="0"/>
+              <a:t>  :</a:t>
+            </a:r>
+            <a:r>
+              <a:rPr lang="en-CA" sz="1000" dirty="0" err="1"/>
               <a:t>funded_person</a:t>
             </a:r>
-            <a:endParaRPr lang="en-CA" sz="1000" dirty="0" smtClean="0"/>
+            <a:endParaRPr lang="en-CA" sz="1000" dirty="0"/>
           </a:p>
           <a:p>
             <a:pPr marL="271463" indent="-271463"/>
@@ -4553,14 +4457,13 @@
               <a:t>	</a:t>
             </a:r>
             <a:r>
-              <a:rPr lang="en-CA" sz="1000" dirty="0" err="1" smtClean="0"/>
+              <a:rPr lang="en-CA" sz="1000" dirty="0" err="1"/>
               <a:t>belongs_to</a:t>
             </a:r>
             <a:r>
-              <a:rPr lang="en-CA" sz="1000" dirty="0" smtClean="0"/>
+              <a:rPr lang="en-CA" sz="1000" dirty="0"/>
               <a:t>	:form</a:t>
             </a:r>
-            <a:endParaRPr lang="en-CA" sz="1000" dirty="0"/>
           </a:p>
         </p:txBody>
       </p:sp>
@@ -4587,18 +4490,17 @@
           <a:lstStyle/>
           <a:p>
             <a:r>
-              <a:rPr lang="en-CA" sz="1100" b="1" dirty="0" smtClean="0"/>
+              <a:rPr lang="en-CA" sz="1100" b="1" dirty="0"/>
               <a:t>(</a:t>
             </a:r>
             <a:r>
-              <a:rPr lang="en-CA" sz="1100" b="1" dirty="0" err="1" smtClean="0"/>
+              <a:rPr lang="en-CA" sz="1100" b="1" dirty="0" err="1"/>
               <a:t>funded_people</a:t>
             </a:r>
             <a:r>
-              <a:rPr lang="en-CA" sz="1100" b="1" dirty="0" smtClean="0"/>
+              <a:rPr lang="en-CA" sz="1100" b="1" dirty="0"/>
               <a:t>)</a:t>
             </a:r>
-            <a:endParaRPr lang="en-CA" sz="1100" b="1" dirty="0"/>
           </a:p>
         </p:txBody>
       </p:sp>
@@ -4625,18 +4527,17 @@
           <a:lstStyle/>
           <a:p>
             <a:r>
-              <a:rPr lang="en-CA" sz="1100" b="1" dirty="0" smtClean="0"/>
+              <a:rPr lang="en-CA" sz="1100" b="1" dirty="0"/>
               <a:t>(</a:t>
             </a:r>
             <a:r>
-              <a:rPr lang="en-CA" sz="1100" b="1" dirty="0" err="1" smtClean="0"/>
+              <a:rPr lang="en-CA" sz="1100" b="1" dirty="0" err="1"/>
               <a:t>province_codes</a:t>
             </a:r>
             <a:r>
-              <a:rPr lang="en-CA" sz="1100" b="1" dirty="0" smtClean="0"/>
+              <a:rPr lang="en-CA" sz="1100" b="1" dirty="0"/>
               <a:t>)</a:t>
             </a:r>
-            <a:endParaRPr lang="en-CA" sz="1100" b="1" dirty="0"/>
           </a:p>
         </p:txBody>
       </p:sp>
@@ -4663,18 +4564,281 @@
           <a:lstStyle/>
           <a:p>
             <a:r>
-              <a:rPr lang="en-CA" sz="1100" b="1" dirty="0" smtClean="0"/>
+              <a:rPr lang="en-CA" sz="1100" b="1" dirty="0"/>
               <a:t>(</a:t>
             </a:r>
             <a:r>
-              <a:rPr lang="en-CA" sz="1100" b="1" dirty="0" err="1" smtClean="0"/>
+              <a:rPr lang="en-CA" sz="1100" b="1" dirty="0" err="1"/>
               <a:t>funded_people</a:t>
             </a:r>
             <a:r>
-              <a:rPr lang="en-CA" sz="1100" b="1" dirty="0" smtClean="0"/>
+              <a:rPr lang="en-CA" sz="1100" b="1" dirty="0"/>
               <a:t>)</a:t>
             </a:r>
-            <a:endParaRPr lang="en-CA" sz="1100" b="1" dirty="0"/>
+          </a:p>
+        </p:txBody>
+      </p:sp>
+      <p:sp>
+        <p:nvSpPr>
+          <p:cNvPr id="2" name="Rectangle 1"/>
+          <p:cNvSpPr/>
+          <p:nvPr/>
+        </p:nvSpPr>
+        <p:spPr>
+          <a:xfrm>
+            <a:off x="6590581" y="2955985"/>
+            <a:ext cx="2122098" cy="1874807"/>
+          </a:xfrm>
+          <a:prstGeom prst="rect">
+            <a:avLst/>
+          </a:prstGeom>
+          <a:noFill/>
+        </p:spPr>
+        <p:style>
+          <a:lnRef idx="2">
+            <a:schemeClr val="accent1">
+              <a:shade val="50000"/>
+            </a:schemeClr>
+          </a:lnRef>
+          <a:fillRef idx="1">
+            <a:schemeClr val="accent1"/>
+          </a:fillRef>
+          <a:effectRef idx="0">
+            <a:schemeClr val="accent1"/>
+          </a:effectRef>
+          <a:fontRef idx="minor">
+            <a:schemeClr val="lt1"/>
+          </a:fontRef>
+        </p:style>
+        <p:txBody>
+          <a:bodyPr rtlCol="0" anchor="ctr"/>
+          <a:lstStyle/>
+          <a:p>
+            <a:pPr algn="ctr"/>
+            <a:endParaRPr lang="en-CA"/>
+          </a:p>
+        </p:txBody>
+      </p:sp>
+      <p:cxnSp>
+        <p:nvCxnSpPr>
+          <p:cNvPr id="9" name="Straight Connector 8"/>
+          <p:cNvCxnSpPr/>
+          <p:nvPr/>
+        </p:nvCxnSpPr>
+        <p:spPr>
+          <a:xfrm>
+            <a:off x="6590581" y="3179638"/>
+            <a:ext cx="2122098" cy="0"/>
+          </a:xfrm>
+          <a:prstGeom prst="line">
+            <a:avLst/>
+          </a:prstGeom>
+        </p:spPr>
+        <p:style>
+          <a:lnRef idx="1">
+            <a:schemeClr val="accent1"/>
+          </a:lnRef>
+          <a:fillRef idx="0">
+            <a:schemeClr val="accent1"/>
+          </a:fillRef>
+          <a:effectRef idx="0">
+            <a:schemeClr val="accent1"/>
+          </a:effectRef>
+          <a:fontRef idx="minor">
+            <a:schemeClr val="tx1"/>
+          </a:fontRef>
+        </p:style>
+      </p:cxnSp>
+      <p:sp>
+        <p:nvSpPr>
+          <p:cNvPr id="12" name="TextBox 11"/>
+          <p:cNvSpPr txBox="1"/>
+          <p:nvPr/>
+        </p:nvSpPr>
+        <p:spPr>
+          <a:xfrm>
+            <a:off x="6750357" y="2861824"/>
+            <a:ext cx="1446422" cy="307777"/>
+          </a:xfrm>
+          <a:prstGeom prst="rect">
+            <a:avLst/>
+          </a:prstGeom>
+          <a:noFill/>
+        </p:spPr>
+        <p:txBody>
+          <a:bodyPr wrap="none" rtlCol="0">
+            <a:spAutoFit/>
+          </a:bodyPr>
+          <a:lstStyle/>
+          <a:p>
+            <a:r>
+              <a:rPr lang="en-CA" sz="1400" dirty="0"/>
+              <a:t>Cf0925s_invoices</a:t>
+            </a:r>
+          </a:p>
+        </p:txBody>
+      </p:sp>
+      <p:sp>
+        <p:nvSpPr>
+          <p:cNvPr id="13" name="TextBox 12"/>
+          <p:cNvSpPr txBox="1"/>
+          <p:nvPr/>
+        </p:nvSpPr>
+        <p:spPr>
+          <a:xfrm>
+            <a:off x="6699849" y="3375804"/>
+            <a:ext cx="881203" cy="830997"/>
+          </a:xfrm>
+          <a:prstGeom prst="rect">
+            <a:avLst/>
+          </a:prstGeom>
+          <a:noFill/>
+        </p:spPr>
+        <p:txBody>
+          <a:bodyPr wrap="none" rtlCol="0">
+            <a:spAutoFit/>
+          </a:bodyPr>
+          <a:lstStyle/>
+          <a:p>
+            <a:r>
+              <a:rPr lang="en-CA" sz="1200" dirty="0"/>
+              <a:t>Cf0925s_id</a:t>
+            </a:r>
+          </a:p>
+          <a:p>
+            <a:r>
+              <a:rPr lang="en-CA" sz="1200" dirty="0" err="1"/>
+              <a:t>Invoices_id</a:t>
+            </a:r>
+            <a:endParaRPr lang="en-CA" sz="1200" dirty="0"/>
+          </a:p>
+          <a:p>
+            <a:r>
+              <a:rPr lang="en-CA" sz="1200" dirty="0"/>
+              <a:t>Amount</a:t>
+            </a:r>
+          </a:p>
+          <a:p>
+            <a:endParaRPr lang="en-CA" sz="1200" dirty="0"/>
+          </a:p>
+        </p:txBody>
+      </p:sp>
+      <p:cxnSp>
+        <p:nvCxnSpPr>
+          <p:cNvPr id="15" name="Straight Connector 14"/>
+          <p:cNvCxnSpPr/>
+          <p:nvPr/>
+        </p:nvCxnSpPr>
+        <p:spPr>
+          <a:xfrm>
+            <a:off x="7183852" y="1625491"/>
+            <a:ext cx="1054109" cy="0"/>
+          </a:xfrm>
+          <a:prstGeom prst="line">
+            <a:avLst/>
+          </a:prstGeom>
+        </p:spPr>
+        <p:style>
+          <a:lnRef idx="1">
+            <a:schemeClr val="accent1"/>
+          </a:lnRef>
+          <a:fillRef idx="0">
+            <a:schemeClr val="accent1"/>
+          </a:fillRef>
+          <a:effectRef idx="0">
+            <a:schemeClr val="accent1"/>
+          </a:effectRef>
+          <a:fontRef idx="minor">
+            <a:schemeClr val="tx1"/>
+          </a:fontRef>
+        </p:style>
+      </p:cxnSp>
+      <p:cxnSp>
+        <p:nvCxnSpPr>
+          <p:cNvPr id="17" name="Straight Connector 16"/>
+          <p:cNvCxnSpPr/>
+          <p:nvPr/>
+        </p:nvCxnSpPr>
+        <p:spPr>
+          <a:xfrm>
+            <a:off x="7140450" y="1625491"/>
+            <a:ext cx="1097511" cy="52973"/>
+          </a:xfrm>
+          <a:prstGeom prst="line">
+            <a:avLst/>
+          </a:prstGeom>
+        </p:spPr>
+        <p:style>
+          <a:lnRef idx="1">
+            <a:schemeClr val="accent1"/>
+          </a:lnRef>
+          <a:fillRef idx="0">
+            <a:schemeClr val="accent1"/>
+          </a:fillRef>
+          <a:effectRef idx="0">
+            <a:schemeClr val="accent1"/>
+          </a:effectRef>
+          <a:fontRef idx="minor">
+            <a:schemeClr val="tx1"/>
+          </a:fontRef>
+        </p:style>
+      </p:cxnSp>
+      <p:sp>
+        <p:nvSpPr>
+          <p:cNvPr id="18" name="TextBox 17"/>
+          <p:cNvSpPr txBox="1"/>
+          <p:nvPr/>
+        </p:nvSpPr>
+        <p:spPr>
+          <a:xfrm>
+            <a:off x="7473568" y="1974662"/>
+            <a:ext cx="184731" cy="369332"/>
+          </a:xfrm>
+          <a:prstGeom prst="rect">
+            <a:avLst/>
+          </a:prstGeom>
+          <a:noFill/>
+        </p:spPr>
+        <p:txBody>
+          <a:bodyPr wrap="none" rtlCol="0">
+            <a:spAutoFit/>
+          </a:bodyPr>
+          <a:lstStyle/>
+          <a:p>
+            <a:endParaRPr lang="en-CA" dirty="0"/>
+          </a:p>
+        </p:txBody>
+      </p:sp>
+      <p:sp>
+        <p:nvSpPr>
+          <p:cNvPr id="19" name="TextBox 18"/>
+          <p:cNvSpPr txBox="1"/>
+          <p:nvPr/>
+        </p:nvSpPr>
+        <p:spPr>
+          <a:xfrm>
+            <a:off x="7085163" y="1869324"/>
+            <a:ext cx="1406154" cy="261610"/>
+          </a:xfrm>
+          <a:prstGeom prst="rect">
+            <a:avLst/>
+          </a:prstGeom>
+          <a:noFill/>
+        </p:spPr>
+        <p:txBody>
+          <a:bodyPr wrap="none" rtlCol="0">
+            <a:spAutoFit/>
+          </a:bodyPr>
+          <a:lstStyle/>
+          <a:p>
+            <a:r>
+              <a:rPr lang="en-CA" sz="1100" dirty="0" err="1"/>
+              <a:t>Invoice_from</a:t>
+            </a:r>
+            <a:r>
+              <a:rPr lang="en-CA" sz="1100" dirty="0"/>
+              <a:t> varchar</a:t>
+            </a:r>
           </a:p>
         </p:txBody>
       </p:sp>

</xml_diff>